<commit_message>
COMP220 induction slides fix
</commit_message>
<xml_diff>
--- a/COMP220/01/2020-21-COMP220-01-induction-materials.pptx
+++ b/COMP220/01/2020-21-COMP220-01-induction-materials.pptx
@@ -258,7 +258,7 @@
           <a:p>
             <a:fld id="{784AA43A-3F76-4A13-9CD6-36134EB429E3}" type="datetimeFigureOut">
               <a:rPr lang="en-US"/>
-              <a:t>1/19/2021</a:t>
+              <a:t>1/20/2021</a:t>
             </a:fld>
             <a:endParaRPr/>
           </a:p>
@@ -423,7 +423,7 @@
           <a:p>
             <a:fld id="{5F674A4F-2B7A-4ECB-A400-260B2FFC03C1}" type="datetimeFigureOut">
               <a:rPr lang="en-US"/>
-              <a:t>1/19/2021</a:t>
+              <a:t>1/20/2021</a:t>
             </a:fld>
             <a:endParaRPr/>
           </a:p>
@@ -1947,7 +1947,7 @@
           <a:p>
             <a:fld id="{48A87A34-81AB-432B-8DAE-1953F412C126}" type="datetimeFigureOut">
               <a:rPr lang="en-US" smtClean="0"/>
-              <a:t>1/19/2021</a:t>
+              <a:t>1/20/2021</a:t>
             </a:fld>
             <a:endParaRPr lang="en-US" dirty="0"/>
           </a:p>
@@ -2227,7 +2227,7 @@
             <a:fld id="{9AFE8FB1-0A7A-443E-AAF7-31D4FA1AA312}" type="datetimeFigureOut">
               <a:rPr lang="en-US" smtClean="0"/>
               <a:pPr/>
-              <a:t>1/19/2021</a:t>
+              <a:t>1/20/2021</a:t>
             </a:fld>
             <a:endParaRPr lang="en-US" dirty="0"/>
           </a:p>
@@ -2460,7 +2460,7 @@
             <a:fld id="{9AFE8FB1-0A7A-443E-AAF7-31D4FA1AA312}" type="datetimeFigureOut">
               <a:rPr lang="en-US" smtClean="0"/>
               <a:pPr/>
-              <a:t>1/19/2021</a:t>
+              <a:t>1/20/2021</a:t>
             </a:fld>
             <a:endParaRPr lang="en-US" dirty="0"/>
           </a:p>
@@ -2772,7 +2772,7 @@
             <a:fld id="{9AFE8FB1-0A7A-443E-AAF7-31D4FA1AA312}" type="datetimeFigureOut">
               <a:rPr lang="en-US" smtClean="0"/>
               <a:pPr/>
-              <a:t>1/19/2021</a:t>
+              <a:t>1/20/2021</a:t>
             </a:fld>
             <a:endParaRPr lang="en-US" dirty="0"/>
           </a:p>
@@ -3247,7 +3247,7 @@
             <a:fld id="{9AFE8FB1-0A7A-443E-AAF7-31D4FA1AA312}" type="datetimeFigureOut">
               <a:rPr lang="en-US" smtClean="0"/>
               <a:pPr/>
-              <a:t>1/19/2021</a:t>
+              <a:t>1/20/2021</a:t>
             </a:fld>
             <a:endParaRPr lang="en-US" dirty="0"/>
           </a:p>
@@ -3796,7 +3796,7 @@
             <a:fld id="{9AFE8FB1-0A7A-443E-AAF7-31D4FA1AA312}" type="datetimeFigureOut">
               <a:rPr lang="en-US" smtClean="0"/>
               <a:pPr/>
-              <a:t>1/19/2021</a:t>
+              <a:t>1/20/2021</a:t>
             </a:fld>
             <a:endParaRPr lang="en-US" dirty="0"/>
           </a:p>
@@ -4572,7 +4572,7 @@
             <a:fld id="{9AFE8FB1-0A7A-443E-AAF7-31D4FA1AA312}" type="datetimeFigureOut">
               <a:rPr lang="en-US" smtClean="0"/>
               <a:pPr/>
-              <a:t>1/19/2021</a:t>
+              <a:t>1/20/2021</a:t>
             </a:fld>
             <a:endParaRPr lang="en-US" dirty="0"/>
           </a:p>
@@ -4748,7 +4748,7 @@
           <a:p>
             <a:fld id="{9AFE8FB1-0A7A-443E-AAF7-31D4FA1AA312}" type="datetimeFigureOut">
               <a:rPr lang="en-US" smtClean="0"/>
-              <a:t>1/19/2021</a:t>
+              <a:t>1/20/2021</a:t>
             </a:fld>
             <a:endParaRPr lang="en-US"/>
           </a:p>
@@ -4983,7 +4983,7 @@
           <a:p>
             <a:fld id="{9AFE8FB1-0A7A-443E-AAF7-31D4FA1AA312}" type="datetimeFigureOut">
               <a:rPr lang="en-US" smtClean="0"/>
-              <a:t>1/19/2021</a:t>
+              <a:t>1/20/2021</a:t>
             </a:fld>
             <a:endParaRPr lang="en-US"/>
           </a:p>
@@ -5175,7 +5175,7 @@
           <a:p>
             <a:fld id="{9AFE8FB1-0A7A-443E-AAF7-31D4FA1AA312}" type="datetimeFigureOut">
               <a:rPr lang="en-US" smtClean="0"/>
-              <a:t>1/19/2021</a:t>
+              <a:t>1/20/2021</a:t>
             </a:fld>
             <a:endParaRPr lang="en-US"/>
           </a:p>
@@ -5476,7 +5476,7 @@
           <a:p>
             <a:fld id="{9AFE8FB1-0A7A-443E-AAF7-31D4FA1AA312}" type="datetimeFigureOut">
               <a:rPr lang="en-US" smtClean="0"/>
-              <a:t>1/19/2021</a:t>
+              <a:t>1/20/2021</a:t>
             </a:fld>
             <a:endParaRPr lang="en-US"/>
           </a:p>
@@ -5730,7 +5730,7 @@
           <a:p>
             <a:fld id="{9AFE8FB1-0A7A-443E-AAF7-31D4FA1AA312}" type="datetimeFigureOut">
               <a:rPr lang="en-US" smtClean="0"/>
-              <a:t>1/19/2021</a:t>
+              <a:t>1/20/2021</a:t>
             </a:fld>
             <a:endParaRPr lang="en-US"/>
           </a:p>
@@ -6121,7 +6121,7 @@
           <a:p>
             <a:fld id="{9AFE8FB1-0A7A-443E-AAF7-31D4FA1AA312}" type="datetimeFigureOut">
               <a:rPr lang="en-US" smtClean="0"/>
-              <a:t>1/19/2021</a:t>
+              <a:t>1/20/2021</a:t>
             </a:fld>
             <a:endParaRPr lang="en-US"/>
           </a:p>
@@ -6251,7 +6251,7 @@
           <a:p>
             <a:fld id="{9AFE8FB1-0A7A-443E-AAF7-31D4FA1AA312}" type="datetimeFigureOut">
               <a:rPr lang="en-US" smtClean="0"/>
-              <a:t>1/19/2021</a:t>
+              <a:t>1/20/2021</a:t>
             </a:fld>
             <a:endParaRPr lang="en-US"/>
           </a:p>
@@ -6358,7 +6358,7 @@
           <a:p>
             <a:fld id="{9AFE8FB1-0A7A-443E-AAF7-31D4FA1AA312}" type="datetimeFigureOut">
               <a:rPr lang="en-US" smtClean="0"/>
-              <a:t>1/19/2021</a:t>
+              <a:t>1/20/2021</a:t>
             </a:fld>
             <a:endParaRPr lang="en-US"/>
           </a:p>
@@ -6619,7 +6619,7 @@
           <a:p>
             <a:fld id="{9AFE8FB1-0A7A-443E-AAF7-31D4FA1AA312}" type="datetimeFigureOut">
               <a:rPr lang="en-US" smtClean="0"/>
-              <a:t>1/19/2021</a:t>
+              <a:t>1/20/2021</a:t>
             </a:fld>
             <a:endParaRPr lang="en-US"/>
           </a:p>
@@ -6888,7 +6888,7 @@
           <a:p>
             <a:fld id="{9AFE8FB1-0A7A-443E-AAF7-31D4FA1AA312}" type="datetimeFigureOut">
               <a:rPr lang="en-US" smtClean="0"/>
-              <a:t>1/19/2021</a:t>
+              <a:t>1/20/2021</a:t>
             </a:fld>
             <a:endParaRPr lang="en-US"/>
           </a:p>
@@ -7144,7 +7144,7 @@
             <a:fld id="{9AFE8FB1-0A7A-443E-AAF7-31D4FA1AA312}" type="datetimeFigureOut">
               <a:rPr lang="en-US" smtClean="0"/>
               <a:pPr/>
-              <a:t>1/19/2021</a:t>
+              <a:t>1/20/2021</a:t>
             </a:fld>
             <a:endParaRPr lang="en-US" dirty="0"/>
           </a:p>
@@ -8021,7 +8021,7 @@
           <a:p>
             <a:r>
               <a:rPr lang="en-GB" dirty="0"/>
-              <a:t>Assignment 1: Artefact Worksheets [50%]</a:t>
+              <a:t>Assignment 1: Artefact Worksheets [70%]</a:t>
             </a:r>
           </a:p>
           <a:p>
@@ -8129,29 +8129,21 @@
           <a:p>
             <a:r>
               <a:rPr lang="en-GB" dirty="0"/>
-              <a:t>Assignment 2: Technical Report [50%]</a:t>
+              <a:t>Assignment 2: Technical Report [30%]</a:t>
             </a:r>
           </a:p>
           <a:p>
             <a:pPr lvl="1"/>
             <a:r>
               <a:rPr lang="en-GB" dirty="0"/>
-              <a:t>Produce a </a:t>
-            </a:r>
-            <a:r>
-              <a:rPr lang="en-GB" dirty="0">
-                <a:solidFill>
-                  <a:schemeClr val="accent5"/>
-                </a:solidFill>
-              </a:rPr>
-              <a:t>web page </a:t>
-            </a:r>
-            <a:r>
-              <a:rPr lang="en-GB" dirty="0"/>
-              <a:t>and a </a:t>
-            </a:r>
-            <a:r>
-              <a:rPr lang="en-GB" dirty="0">
+              <a:t>Produce </a:t>
+            </a:r>
+            <a:r>
+              <a:rPr lang="en-GB"/>
+              <a:t>a </a:t>
+            </a:r>
+            <a:r>
+              <a:rPr lang="en-GB">
                 <a:solidFill>
                   <a:schemeClr val="accent5"/>
                 </a:solidFill>
@@ -8159,8 +8151,12 @@
               <a:t>poster</a:t>
             </a:r>
             <a:r>
+              <a:rPr lang="en-GB"/>
+              <a:t> </a:t>
+            </a:r>
+            <a:r>
               <a:rPr lang="en-GB" dirty="0"/>
-              <a:t> to </a:t>
+              <a:t>to </a:t>
             </a:r>
             <a:r>
               <a:rPr lang="en-GB" dirty="0">

</xml_diff>

<commit_message>
Fixing COMP220 induction roadmap
</commit_message>
<xml_diff>
--- a/COMP220/01/2020-21-COMP220-01-induction-materials.pptx
+++ b/COMP220/01/2020-21-COMP220-01-induction-materials.pptx
@@ -258,7 +258,7 @@
           <a:p>
             <a:fld id="{784AA43A-3F76-4A13-9CD6-36134EB429E3}" type="datetimeFigureOut">
               <a:rPr lang="en-US"/>
-              <a:t>1/20/2021</a:t>
+              <a:t>1/23/2021</a:t>
             </a:fld>
             <a:endParaRPr/>
           </a:p>
@@ -423,7 +423,7 @@
           <a:p>
             <a:fld id="{5F674A4F-2B7A-4ECB-A400-260B2FFC03C1}" type="datetimeFigureOut">
               <a:rPr lang="en-US"/>
-              <a:t>1/20/2021</a:t>
+              <a:t>1/23/2021</a:t>
             </a:fld>
             <a:endParaRPr/>
           </a:p>
@@ -1947,7 +1947,7 @@
           <a:p>
             <a:fld id="{48A87A34-81AB-432B-8DAE-1953F412C126}" type="datetimeFigureOut">
               <a:rPr lang="en-US" smtClean="0"/>
-              <a:t>1/20/2021</a:t>
+              <a:t>1/23/2021</a:t>
             </a:fld>
             <a:endParaRPr lang="en-US" dirty="0"/>
           </a:p>
@@ -2227,7 +2227,7 @@
             <a:fld id="{9AFE8FB1-0A7A-443E-AAF7-31D4FA1AA312}" type="datetimeFigureOut">
               <a:rPr lang="en-US" smtClean="0"/>
               <a:pPr/>
-              <a:t>1/20/2021</a:t>
+              <a:t>1/23/2021</a:t>
             </a:fld>
             <a:endParaRPr lang="en-US" dirty="0"/>
           </a:p>
@@ -2460,7 +2460,7 @@
             <a:fld id="{9AFE8FB1-0A7A-443E-AAF7-31D4FA1AA312}" type="datetimeFigureOut">
               <a:rPr lang="en-US" smtClean="0"/>
               <a:pPr/>
-              <a:t>1/20/2021</a:t>
+              <a:t>1/23/2021</a:t>
             </a:fld>
             <a:endParaRPr lang="en-US" dirty="0"/>
           </a:p>
@@ -2772,7 +2772,7 @@
             <a:fld id="{9AFE8FB1-0A7A-443E-AAF7-31D4FA1AA312}" type="datetimeFigureOut">
               <a:rPr lang="en-US" smtClean="0"/>
               <a:pPr/>
-              <a:t>1/20/2021</a:t>
+              <a:t>1/23/2021</a:t>
             </a:fld>
             <a:endParaRPr lang="en-US" dirty="0"/>
           </a:p>
@@ -3247,7 +3247,7 @@
             <a:fld id="{9AFE8FB1-0A7A-443E-AAF7-31D4FA1AA312}" type="datetimeFigureOut">
               <a:rPr lang="en-US" smtClean="0"/>
               <a:pPr/>
-              <a:t>1/20/2021</a:t>
+              <a:t>1/23/2021</a:t>
             </a:fld>
             <a:endParaRPr lang="en-US" dirty="0"/>
           </a:p>
@@ -3796,7 +3796,7 @@
             <a:fld id="{9AFE8FB1-0A7A-443E-AAF7-31D4FA1AA312}" type="datetimeFigureOut">
               <a:rPr lang="en-US" smtClean="0"/>
               <a:pPr/>
-              <a:t>1/20/2021</a:t>
+              <a:t>1/23/2021</a:t>
             </a:fld>
             <a:endParaRPr lang="en-US" dirty="0"/>
           </a:p>
@@ -4572,7 +4572,7 @@
             <a:fld id="{9AFE8FB1-0A7A-443E-AAF7-31D4FA1AA312}" type="datetimeFigureOut">
               <a:rPr lang="en-US" smtClean="0"/>
               <a:pPr/>
-              <a:t>1/20/2021</a:t>
+              <a:t>1/23/2021</a:t>
             </a:fld>
             <a:endParaRPr lang="en-US" dirty="0"/>
           </a:p>
@@ -4748,7 +4748,7 @@
           <a:p>
             <a:fld id="{9AFE8FB1-0A7A-443E-AAF7-31D4FA1AA312}" type="datetimeFigureOut">
               <a:rPr lang="en-US" smtClean="0"/>
-              <a:t>1/20/2021</a:t>
+              <a:t>1/23/2021</a:t>
             </a:fld>
             <a:endParaRPr lang="en-US"/>
           </a:p>
@@ -4983,7 +4983,7 @@
           <a:p>
             <a:fld id="{9AFE8FB1-0A7A-443E-AAF7-31D4FA1AA312}" type="datetimeFigureOut">
               <a:rPr lang="en-US" smtClean="0"/>
-              <a:t>1/20/2021</a:t>
+              <a:t>1/23/2021</a:t>
             </a:fld>
             <a:endParaRPr lang="en-US"/>
           </a:p>
@@ -5175,7 +5175,7 @@
           <a:p>
             <a:fld id="{9AFE8FB1-0A7A-443E-AAF7-31D4FA1AA312}" type="datetimeFigureOut">
               <a:rPr lang="en-US" smtClean="0"/>
-              <a:t>1/20/2021</a:t>
+              <a:t>1/23/2021</a:t>
             </a:fld>
             <a:endParaRPr lang="en-US"/>
           </a:p>
@@ -5476,7 +5476,7 @@
           <a:p>
             <a:fld id="{9AFE8FB1-0A7A-443E-AAF7-31D4FA1AA312}" type="datetimeFigureOut">
               <a:rPr lang="en-US" smtClean="0"/>
-              <a:t>1/20/2021</a:t>
+              <a:t>1/23/2021</a:t>
             </a:fld>
             <a:endParaRPr lang="en-US"/>
           </a:p>
@@ -5730,7 +5730,7 @@
           <a:p>
             <a:fld id="{9AFE8FB1-0A7A-443E-AAF7-31D4FA1AA312}" type="datetimeFigureOut">
               <a:rPr lang="en-US" smtClean="0"/>
-              <a:t>1/20/2021</a:t>
+              <a:t>1/23/2021</a:t>
             </a:fld>
             <a:endParaRPr lang="en-US"/>
           </a:p>
@@ -6121,7 +6121,7 @@
           <a:p>
             <a:fld id="{9AFE8FB1-0A7A-443E-AAF7-31D4FA1AA312}" type="datetimeFigureOut">
               <a:rPr lang="en-US" smtClean="0"/>
-              <a:t>1/20/2021</a:t>
+              <a:t>1/23/2021</a:t>
             </a:fld>
             <a:endParaRPr lang="en-US"/>
           </a:p>
@@ -6251,7 +6251,7 @@
           <a:p>
             <a:fld id="{9AFE8FB1-0A7A-443E-AAF7-31D4FA1AA312}" type="datetimeFigureOut">
               <a:rPr lang="en-US" smtClean="0"/>
-              <a:t>1/20/2021</a:t>
+              <a:t>1/23/2021</a:t>
             </a:fld>
             <a:endParaRPr lang="en-US"/>
           </a:p>
@@ -6358,7 +6358,7 @@
           <a:p>
             <a:fld id="{9AFE8FB1-0A7A-443E-AAF7-31D4FA1AA312}" type="datetimeFigureOut">
               <a:rPr lang="en-US" smtClean="0"/>
-              <a:t>1/20/2021</a:t>
+              <a:t>1/23/2021</a:t>
             </a:fld>
             <a:endParaRPr lang="en-US"/>
           </a:p>
@@ -6619,7 +6619,7 @@
           <a:p>
             <a:fld id="{9AFE8FB1-0A7A-443E-AAF7-31D4FA1AA312}" type="datetimeFigureOut">
               <a:rPr lang="en-US" smtClean="0"/>
-              <a:t>1/20/2021</a:t>
+              <a:t>1/23/2021</a:t>
             </a:fld>
             <a:endParaRPr lang="en-US"/>
           </a:p>
@@ -6888,7 +6888,7 @@
           <a:p>
             <a:fld id="{9AFE8FB1-0A7A-443E-AAF7-31D4FA1AA312}" type="datetimeFigureOut">
               <a:rPr lang="en-US" smtClean="0"/>
-              <a:t>1/20/2021</a:t>
+              <a:t>1/23/2021</a:t>
             </a:fld>
             <a:endParaRPr lang="en-US"/>
           </a:p>
@@ -7144,7 +7144,7 @@
             <a:fld id="{9AFE8FB1-0A7A-443E-AAF7-31D4FA1AA312}" type="datetimeFigureOut">
               <a:rPr lang="en-US" smtClean="0"/>
               <a:pPr/>
-              <a:t>1/20/2021</a:t>
+              <a:t>1/23/2021</a:t>
             </a:fld>
             <a:endParaRPr lang="en-US" dirty="0"/>
           </a:p>
@@ -8833,7 +8833,7 @@
             <p:ph idx="1"/>
             <p:extLst>
               <p:ext uri="{D42A27DB-BD31-4B8C-83A1-F6EECF244321}">
-                <p14:modId xmlns:p14="http://schemas.microsoft.com/office/powerpoint/2010/main" val="1525987568"/>
+                <p14:modId xmlns:p14="http://schemas.microsoft.com/office/powerpoint/2010/main" val="2650486486"/>
               </p:ext>
             </p:extLst>
           </p:nvPr>
@@ -9026,7 +9026,7 @@
                     <a:p>
                       <a:r>
                         <a:rPr lang="en-GB" sz="1800" b="1" dirty="0"/>
-                        <a:t>Meshes and Shaders</a:t>
+                        <a:t>Meshes and Transforms</a:t>
                       </a:r>
                       <a:endParaRPr lang="en-GB" sz="1800" b="0" dirty="0"/>
                     </a:p>
@@ -11782,7 +11782,7 @@
             <p:ph idx="1"/>
             <p:extLst>
               <p:ext uri="{D42A27DB-BD31-4B8C-83A1-F6EECF244321}">
-                <p14:modId xmlns:p14="http://schemas.microsoft.com/office/powerpoint/2010/main" val="2255719699"/>
+                <p14:modId xmlns:p14="http://schemas.microsoft.com/office/powerpoint/2010/main" val="2961681368"/>
               </p:ext>
             </p:extLst>
           </p:nvPr>
@@ -12012,7 +12012,7 @@
                       </a:pPr>
                       <a:r>
                         <a:rPr lang="en-GB" sz="1400" dirty="0"/>
-                        <a:t>Transformations</a:t>
+                        <a:t>Shaders/GLSL</a:t>
                       </a:r>
                     </a:p>
                   </a:txBody>
@@ -12025,7 +12025,7 @@
                     <a:p>
                       <a:r>
                         <a:rPr lang="en-GB" sz="1800" b="1" dirty="0"/>
-                        <a:t>Meshes and Shaders</a:t>
+                        <a:t>Meshes and Transforms</a:t>
                       </a:r>
                       <a:endParaRPr lang="en-GB" sz="1800" b="0" dirty="0"/>
                     </a:p>
@@ -12045,9 +12045,10 @@
                         <a:buChar char="•"/>
                       </a:pPr>
                       <a:r>
-                        <a:rPr lang="en-GB" sz="1400" b="0" dirty="0"/>
-                        <a:t>Vertex shading in GLSL</a:t>
+                        <a:rPr lang="en-GB" sz="1400" dirty="0"/>
+                        <a:t>Transforms and the projection matrix</a:t>
                       </a:r>
+                      <a:endParaRPr lang="en-GB" sz="1400" b="0" dirty="0"/>
                     </a:p>
                   </a:txBody>
                   <a:tcPr marL="91416" marR="91416" marT="45708" marB="45708"/>

</xml_diff>

<commit_message>
COMP220 week 7 & 8 updates
</commit_message>
<xml_diff>
--- a/COMP220/01/2020-21-COMP220-01-induction-materials.pptx
+++ b/COMP220/01/2020-21-COMP220-01-induction-materials.pptx
@@ -258,7 +258,7 @@
           <a:p>
             <a:fld id="{784AA43A-3F76-4A13-9CD6-36134EB429E3}" type="datetimeFigureOut">
               <a:rPr lang="en-US"/>
-              <a:t>1/23/2021</a:t>
+              <a:t>3/6/2021</a:t>
             </a:fld>
             <a:endParaRPr/>
           </a:p>
@@ -423,7 +423,7 @@
           <a:p>
             <a:fld id="{5F674A4F-2B7A-4ECB-A400-260B2FFC03C1}" type="datetimeFigureOut">
               <a:rPr lang="en-US"/>
-              <a:t>1/23/2021</a:t>
+              <a:t>3/6/2021</a:t>
             </a:fld>
             <a:endParaRPr/>
           </a:p>
@@ -1947,7 +1947,7 @@
           <a:p>
             <a:fld id="{48A87A34-81AB-432B-8DAE-1953F412C126}" type="datetimeFigureOut">
               <a:rPr lang="en-US" smtClean="0"/>
-              <a:t>1/23/2021</a:t>
+              <a:t>3/6/2021</a:t>
             </a:fld>
             <a:endParaRPr lang="en-US" dirty="0"/>
           </a:p>
@@ -2227,7 +2227,7 @@
             <a:fld id="{9AFE8FB1-0A7A-443E-AAF7-31D4FA1AA312}" type="datetimeFigureOut">
               <a:rPr lang="en-US" smtClean="0"/>
               <a:pPr/>
-              <a:t>1/23/2021</a:t>
+              <a:t>3/6/2021</a:t>
             </a:fld>
             <a:endParaRPr lang="en-US" dirty="0"/>
           </a:p>
@@ -2460,7 +2460,7 @@
             <a:fld id="{9AFE8FB1-0A7A-443E-AAF7-31D4FA1AA312}" type="datetimeFigureOut">
               <a:rPr lang="en-US" smtClean="0"/>
               <a:pPr/>
-              <a:t>1/23/2021</a:t>
+              <a:t>3/6/2021</a:t>
             </a:fld>
             <a:endParaRPr lang="en-US" dirty="0"/>
           </a:p>
@@ -2772,7 +2772,7 @@
             <a:fld id="{9AFE8FB1-0A7A-443E-AAF7-31D4FA1AA312}" type="datetimeFigureOut">
               <a:rPr lang="en-US" smtClean="0"/>
               <a:pPr/>
-              <a:t>1/23/2021</a:t>
+              <a:t>3/6/2021</a:t>
             </a:fld>
             <a:endParaRPr lang="en-US" dirty="0"/>
           </a:p>
@@ -3247,7 +3247,7 @@
             <a:fld id="{9AFE8FB1-0A7A-443E-AAF7-31D4FA1AA312}" type="datetimeFigureOut">
               <a:rPr lang="en-US" smtClean="0"/>
               <a:pPr/>
-              <a:t>1/23/2021</a:t>
+              <a:t>3/6/2021</a:t>
             </a:fld>
             <a:endParaRPr lang="en-US" dirty="0"/>
           </a:p>
@@ -3796,7 +3796,7 @@
             <a:fld id="{9AFE8FB1-0A7A-443E-AAF7-31D4FA1AA312}" type="datetimeFigureOut">
               <a:rPr lang="en-US" smtClean="0"/>
               <a:pPr/>
-              <a:t>1/23/2021</a:t>
+              <a:t>3/6/2021</a:t>
             </a:fld>
             <a:endParaRPr lang="en-US" dirty="0"/>
           </a:p>
@@ -4572,7 +4572,7 @@
             <a:fld id="{9AFE8FB1-0A7A-443E-AAF7-31D4FA1AA312}" type="datetimeFigureOut">
               <a:rPr lang="en-US" smtClean="0"/>
               <a:pPr/>
-              <a:t>1/23/2021</a:t>
+              <a:t>3/6/2021</a:t>
             </a:fld>
             <a:endParaRPr lang="en-US" dirty="0"/>
           </a:p>
@@ -4748,7 +4748,7 @@
           <a:p>
             <a:fld id="{9AFE8FB1-0A7A-443E-AAF7-31D4FA1AA312}" type="datetimeFigureOut">
               <a:rPr lang="en-US" smtClean="0"/>
-              <a:t>1/23/2021</a:t>
+              <a:t>3/6/2021</a:t>
             </a:fld>
             <a:endParaRPr lang="en-US"/>
           </a:p>
@@ -4983,7 +4983,7 @@
           <a:p>
             <a:fld id="{9AFE8FB1-0A7A-443E-AAF7-31D4FA1AA312}" type="datetimeFigureOut">
               <a:rPr lang="en-US" smtClean="0"/>
-              <a:t>1/23/2021</a:t>
+              <a:t>3/6/2021</a:t>
             </a:fld>
             <a:endParaRPr lang="en-US"/>
           </a:p>
@@ -5175,7 +5175,7 @@
           <a:p>
             <a:fld id="{9AFE8FB1-0A7A-443E-AAF7-31D4FA1AA312}" type="datetimeFigureOut">
               <a:rPr lang="en-US" smtClean="0"/>
-              <a:t>1/23/2021</a:t>
+              <a:t>3/6/2021</a:t>
             </a:fld>
             <a:endParaRPr lang="en-US"/>
           </a:p>
@@ -5476,7 +5476,7 @@
           <a:p>
             <a:fld id="{9AFE8FB1-0A7A-443E-AAF7-31D4FA1AA312}" type="datetimeFigureOut">
               <a:rPr lang="en-US" smtClean="0"/>
-              <a:t>1/23/2021</a:t>
+              <a:t>3/6/2021</a:t>
             </a:fld>
             <a:endParaRPr lang="en-US"/>
           </a:p>
@@ -5730,7 +5730,7 @@
           <a:p>
             <a:fld id="{9AFE8FB1-0A7A-443E-AAF7-31D4FA1AA312}" type="datetimeFigureOut">
               <a:rPr lang="en-US" smtClean="0"/>
-              <a:t>1/23/2021</a:t>
+              <a:t>3/6/2021</a:t>
             </a:fld>
             <a:endParaRPr lang="en-US"/>
           </a:p>
@@ -6121,7 +6121,7 @@
           <a:p>
             <a:fld id="{9AFE8FB1-0A7A-443E-AAF7-31D4FA1AA312}" type="datetimeFigureOut">
               <a:rPr lang="en-US" smtClean="0"/>
-              <a:t>1/23/2021</a:t>
+              <a:t>3/6/2021</a:t>
             </a:fld>
             <a:endParaRPr lang="en-US"/>
           </a:p>
@@ -6251,7 +6251,7 @@
           <a:p>
             <a:fld id="{9AFE8FB1-0A7A-443E-AAF7-31D4FA1AA312}" type="datetimeFigureOut">
               <a:rPr lang="en-US" smtClean="0"/>
-              <a:t>1/23/2021</a:t>
+              <a:t>3/6/2021</a:t>
             </a:fld>
             <a:endParaRPr lang="en-US"/>
           </a:p>
@@ -6358,7 +6358,7 @@
           <a:p>
             <a:fld id="{9AFE8FB1-0A7A-443E-AAF7-31D4FA1AA312}" type="datetimeFigureOut">
               <a:rPr lang="en-US" smtClean="0"/>
-              <a:t>1/23/2021</a:t>
+              <a:t>3/6/2021</a:t>
             </a:fld>
             <a:endParaRPr lang="en-US"/>
           </a:p>
@@ -6619,7 +6619,7 @@
           <a:p>
             <a:fld id="{9AFE8FB1-0A7A-443E-AAF7-31D4FA1AA312}" type="datetimeFigureOut">
               <a:rPr lang="en-US" smtClean="0"/>
-              <a:t>1/23/2021</a:t>
+              <a:t>3/6/2021</a:t>
             </a:fld>
             <a:endParaRPr lang="en-US"/>
           </a:p>
@@ -6888,7 +6888,7 @@
           <a:p>
             <a:fld id="{9AFE8FB1-0A7A-443E-AAF7-31D4FA1AA312}" type="datetimeFigureOut">
               <a:rPr lang="en-US" smtClean="0"/>
-              <a:t>1/23/2021</a:t>
+              <a:t>3/6/2021</a:t>
             </a:fld>
             <a:endParaRPr lang="en-US"/>
           </a:p>
@@ -7144,7 +7144,7 @@
             <a:fld id="{9AFE8FB1-0A7A-443E-AAF7-31D4FA1AA312}" type="datetimeFigureOut">
               <a:rPr lang="en-US" smtClean="0"/>
               <a:pPr/>
-              <a:t>1/23/2021</a:t>
+              <a:t>3/6/2021</a:t>
             </a:fld>
             <a:endParaRPr lang="en-US" dirty="0"/>
           </a:p>
@@ -8833,7 +8833,7 @@
             <p:ph idx="1"/>
             <p:extLst>
               <p:ext uri="{D42A27DB-BD31-4B8C-83A1-F6EECF244321}">
-                <p14:modId xmlns:p14="http://schemas.microsoft.com/office/powerpoint/2010/main" val="2650486486"/>
+                <p14:modId xmlns:p14="http://schemas.microsoft.com/office/powerpoint/2010/main" val="1266060052"/>
               </p:ext>
             </p:extLst>
           </p:nvPr>
@@ -9026,7 +9026,7 @@
                     <a:p>
                       <a:r>
                         <a:rPr lang="en-GB" sz="1800" b="1" dirty="0"/>
-                        <a:t>Meshes and Transforms</a:t>
+                        <a:t>Vertices &amp; Transforms</a:t>
                       </a:r>
                       <a:endParaRPr lang="en-GB" sz="1800" b="0" dirty="0"/>
                     </a:p>
@@ -9054,7 +9054,7 @@
                     <a:p>
                       <a:r>
                         <a:rPr lang="en-GB" sz="1800" b="1" dirty="0"/>
-                        <a:t>Materials and Lighting</a:t>
+                        <a:t>Textures &amp; Models</a:t>
                       </a:r>
                       <a:endParaRPr lang="en-GB" sz="1800" b="0" dirty="0"/>
                     </a:p>
@@ -9319,7 +9319,7 @@
           <p:nvPr>
             <p:extLst>
               <p:ext uri="{D42A27DB-BD31-4B8C-83A1-F6EECF244321}">
-                <p14:modId xmlns:p14="http://schemas.microsoft.com/office/powerpoint/2010/main" val="203850716"/>
+                <p14:modId xmlns:p14="http://schemas.microsoft.com/office/powerpoint/2010/main" val="147197791"/>
               </p:ext>
             </p:extLst>
           </p:nvPr>
@@ -9459,7 +9459,7 @@
                     <a:p>
                       <a:r>
                         <a:rPr lang="en-GB" sz="1800" b="1" dirty="0"/>
-                        <a:t>Post-processing</a:t>
+                        <a:t>Lighting</a:t>
                       </a:r>
                     </a:p>
                   </a:txBody>
@@ -9472,7 +9472,7 @@
                     <a:p>
                       <a:r>
                         <a:rPr lang="en-GB" sz="1800" b="1" dirty="0"/>
-                        <a:t>Simulating Physics</a:t>
+                        <a:t>Post-processing</a:t>
                       </a:r>
                     </a:p>
                   </a:txBody>
@@ -9518,9 +9518,10 @@
                         <a:buNone/>
                       </a:pPr>
                       <a:r>
-                        <a:rPr lang="en-GB" sz="1800" b="1" dirty="0"/>
-                        <a:t>Rigging and Animation</a:t>
+                        <a:rPr lang="en-GB" sz="1800" b="1"/>
+                        <a:t>Simulation &amp; Animation</a:t>
                       </a:r>
+                      <a:endParaRPr lang="en-GB" sz="1800" b="1" dirty="0"/>
                     </a:p>
                   </a:txBody>
                   <a:tcPr marL="91416" marR="91416" marT="45708" marB="45708"/>
@@ -11782,7 +11783,7 @@
             <p:ph idx="1"/>
             <p:extLst>
               <p:ext uri="{D42A27DB-BD31-4B8C-83A1-F6EECF244321}">
-                <p14:modId xmlns:p14="http://schemas.microsoft.com/office/powerpoint/2010/main" val="2961681368"/>
+                <p14:modId xmlns:p14="http://schemas.microsoft.com/office/powerpoint/2010/main" val="1309645061"/>
               </p:ext>
             </p:extLst>
           </p:nvPr>
@@ -12025,7 +12026,7 @@
                     <a:p>
                       <a:r>
                         <a:rPr lang="en-GB" sz="1800" b="1" dirty="0"/>
-                        <a:t>Meshes and Transforms</a:t>
+                        <a:t>Vertices &amp; Transforms</a:t>
                       </a:r>
                       <a:endParaRPr lang="en-GB" sz="1800" b="0" dirty="0"/>
                     </a:p>
@@ -12080,7 +12081,7 @@
                     <a:p>
                       <a:r>
                         <a:rPr lang="en-GB" sz="1800" b="1" dirty="0"/>
-                        <a:t>Materials and Lighting</a:t>
+                        <a:t>Textures &amp; Models</a:t>
                       </a:r>
                     </a:p>
                     <a:p>
@@ -12100,7 +12101,7 @@
                       </a:pPr>
                       <a:r>
                         <a:rPr lang="en-GB" sz="1400" b="0" dirty="0"/>
-                        <a:t>Using vectors to apply a variety of lighting effects</a:t>
+                        <a:t>Loading 3D models from file</a:t>
                       </a:r>
                     </a:p>
                   </a:txBody>
@@ -12364,13 +12365,13 @@
           <p:nvPr>
             <p:extLst>
               <p:ext uri="{D42A27DB-BD31-4B8C-83A1-F6EECF244321}">
-                <p14:modId xmlns:p14="http://schemas.microsoft.com/office/powerpoint/2010/main" val="958839003"/>
+                <p14:modId xmlns:p14="http://schemas.microsoft.com/office/powerpoint/2010/main" val="1483913103"/>
               </p:ext>
             </p:extLst>
           </p:nvPr>
         </p:nvGraphicFramePr>
         <p:xfrm>
-          <a:off x="2727043" y="4176870"/>
+          <a:off x="2751884" y="4176870"/>
           <a:ext cx="7213716" cy="2570062"/>
         </p:xfrm>
         <a:graphic>
@@ -12504,7 +12505,7 @@
                     <a:p>
                       <a:r>
                         <a:rPr lang="en-GB" sz="1800" b="1" dirty="0"/>
-                        <a:t>Post-processing</a:t>
+                        <a:t>Lighting</a:t>
                       </a:r>
                     </a:p>
                     <a:p>
@@ -12514,17 +12515,15 @@
                       </a:pPr>
                       <a:r>
                         <a:rPr lang="en-GB" sz="1400" dirty="0"/>
-                        <a:t>The frame buffer and its uses</a:t>
+                        <a:t>The Blinn-</a:t>
                       </a:r>
-                    </a:p>
-                    <a:p>
-                      <a:pPr marL="285750" indent="-285750">
-                        <a:buFont typeface="Arial" panose="020B0604020202020204" pitchFamily="34" charset="0"/>
-                        <a:buChar char="•"/>
-                      </a:pPr>
+                      <a:r>
+                        <a:rPr lang="en-GB" sz="1400" dirty="0" err="1"/>
+                        <a:t>Phong</a:t>
+                      </a:r>
                       <a:r>
                         <a:rPr lang="en-GB" sz="1400" dirty="0"/>
-                        <a:t>Creating effects in GLSL</a:t>
+                        <a:t> illumination model</a:t>
                       </a:r>
                     </a:p>
                   </a:txBody>
@@ -12535,19 +12534,111 @@
                     <a:bodyPr/>
                     <a:lstStyle/>
                     <a:p>
+                      <a:pPr marL="0" marR="0" lvl="0" indent="0" algn="l" defTabSz="914126" rtl="0" eaLnBrk="1" fontAlgn="auto" latinLnBrk="0" hangingPunct="1">
+                        <a:lnSpc>
+                          <a:spcPct val="100000"/>
+                        </a:lnSpc>
+                        <a:spcBef>
+                          <a:spcPts val="0"/>
+                        </a:spcBef>
+                        <a:spcAft>
+                          <a:spcPts val="0"/>
+                        </a:spcAft>
+                        <a:buClrTx/>
+                        <a:buSzTx/>
+                        <a:buFontTx/>
+                        <a:buNone/>
+                        <a:tabLst/>
+                        <a:defRPr/>
+                      </a:pPr>
                       <a:r>
-                        <a:rPr lang="en-GB" sz="1800" b="1" dirty="0"/>
-                        <a:t>Simulating Physics</a:t>
+                        <a:rPr kumimoji="0" lang="en-GB" sz="1800" b="1" i="0" u="none" strike="noStrike" kern="1200" cap="none" spc="0" normalizeH="0" baseline="0" noProof="0" dirty="0">
+                          <a:ln>
+                            <a:noFill/>
+                          </a:ln>
+                          <a:solidFill>
+                            <a:prstClr val="black"/>
+                          </a:solidFill>
+                          <a:effectLst/>
+                          <a:uLnTx/>
+                          <a:uFillTx/>
+                          <a:latin typeface="+mn-lt"/>
+                          <a:ea typeface="+mn-ea"/>
+                          <a:cs typeface="+mn-cs"/>
+                        </a:rPr>
+                        <a:t>Post-processing</a:t>
                       </a:r>
                     </a:p>
                     <a:p>
-                      <a:pPr marL="285750" indent="-285750">
+                      <a:pPr marL="285750" marR="0" lvl="0" indent="-285750" algn="l" defTabSz="914126" rtl="0" eaLnBrk="1" fontAlgn="auto" latinLnBrk="0" hangingPunct="1">
+                        <a:lnSpc>
+                          <a:spcPct val="100000"/>
+                        </a:lnSpc>
+                        <a:spcBef>
+                          <a:spcPts val="0"/>
+                        </a:spcBef>
+                        <a:spcAft>
+                          <a:spcPts val="0"/>
+                        </a:spcAft>
+                        <a:buClrTx/>
+                        <a:buSzTx/>
                         <a:buFont typeface="Arial" panose="020B0604020202020204" pitchFamily="34" charset="0"/>
                         <a:buChar char="•"/>
+                        <a:tabLst/>
+                        <a:defRPr/>
                       </a:pPr>
                       <a:r>
-                        <a:rPr lang="en-GB" sz="1400" dirty="0"/>
-                        <a:t>Rigid body dynamics using the Bullet Physics Engine</a:t>
+                        <a:rPr kumimoji="0" lang="en-GB" sz="1400" b="0" i="0" u="none" strike="noStrike" kern="1200" cap="none" spc="0" normalizeH="0" baseline="0" noProof="0" dirty="0">
+                          <a:ln>
+                            <a:noFill/>
+                          </a:ln>
+                          <a:solidFill>
+                            <a:prstClr val="black"/>
+                          </a:solidFill>
+                          <a:effectLst/>
+                          <a:uLnTx/>
+                          <a:uFillTx/>
+                          <a:latin typeface="+mn-lt"/>
+                          <a:ea typeface="+mn-ea"/>
+                          <a:cs typeface="+mn-cs"/>
+                        </a:rPr>
+                        <a:t>The frame buffer and its uses</a:t>
+                      </a:r>
+                    </a:p>
+                    <a:p>
+                      <a:pPr marL="285750" marR="0" lvl="0" indent="-285750" algn="l" defTabSz="914126" rtl="0" eaLnBrk="1" fontAlgn="auto" latinLnBrk="0" hangingPunct="1">
+                        <a:lnSpc>
+                          <a:spcPct val="100000"/>
+                        </a:lnSpc>
+                        <a:spcBef>
+                          <a:spcPts val="0"/>
+                        </a:spcBef>
+                        <a:spcAft>
+                          <a:spcPts val="0"/>
+                        </a:spcAft>
+                        <a:buClrTx/>
+                        <a:buSzTx/>
+                        <a:buFont typeface="Arial" panose="020B0604020202020204" pitchFamily="34" charset="0"/>
+                        <a:buChar char="•"/>
+                        <a:tabLst/>
+                        <a:defRPr/>
+                      </a:pPr>
+                      <a:r>
+                        <a:rPr kumimoji="0" lang="en-GB" sz="1400" b="0" i="0" u="none" strike="noStrike" kern="1200" cap="none" spc="0" normalizeH="0" baseline="0" noProof="0" dirty="0">
+                          <a:ln>
+                            <a:noFill/>
+                          </a:ln>
+                          <a:solidFill>
+                            <a:prstClr val="black"/>
+                          </a:solidFill>
+                          <a:effectLst/>
+                          <a:uLnTx/>
+                          <a:uFillTx/>
+                          <a:latin typeface="+mn-lt"/>
+                          <a:ea typeface="+mn-ea"/>
+                          <a:cs typeface="+mn-cs"/>
+                        </a:rPr>
+                        <a:t>Creating effects in GLSL</a:t>
                       </a:r>
                     </a:p>
                   </a:txBody>
@@ -12614,8 +12705,32 @@
                       </a:pPr>
                       <a:r>
                         <a:rPr lang="en-GB" sz="1800" b="1" dirty="0"/>
-                        <a:t>Rigging and Animation</a:t>
+                        <a:t>Simulation &amp; Animation</a:t>
                       </a:r>
+                    </a:p>
+                    <a:p>
+                      <a:pPr marL="285750" marR="0" lvl="0" indent="-285750" algn="l" defTabSz="914126" rtl="0" eaLnBrk="1" fontAlgn="auto" latinLnBrk="0" hangingPunct="1">
+                        <a:lnSpc>
+                          <a:spcPct val="100000"/>
+                        </a:lnSpc>
+                        <a:spcBef>
+                          <a:spcPts val="0"/>
+                        </a:spcBef>
+                        <a:spcAft>
+                          <a:spcPts val="0"/>
+                        </a:spcAft>
+                        <a:buClrTx/>
+                        <a:buSzTx/>
+                        <a:buFont typeface="Arial" panose="020B0604020202020204" pitchFamily="34" charset="0"/>
+                        <a:buChar char="•"/>
+                        <a:tabLst/>
+                        <a:defRPr/>
+                      </a:pPr>
+                      <a:r>
+                        <a:rPr lang="en-GB" sz="1400" dirty="0"/>
+                        <a:t>Rigid body dynamics using the Bullet Physics Engine</a:t>
+                      </a:r>
+                      <a:endParaRPr lang="en-GB" sz="1400" b="0" dirty="0"/>
                     </a:p>
                     <a:p>
                       <a:pPr marL="285750" indent="-285750">
@@ -12624,17 +12739,7 @@
                       </a:pPr>
                       <a:r>
                         <a:rPr lang="en-GB" sz="1400" b="0" dirty="0"/>
-                        <a:t>Construction and animation of articulated figures</a:t>
-                      </a:r>
-                    </a:p>
-                    <a:p>
-                      <a:pPr marL="285750" indent="-285750">
-                        <a:buFont typeface="Arial" panose="020B0604020202020204" pitchFamily="34" charset="0"/>
-                        <a:buChar char="•"/>
-                      </a:pPr>
-                      <a:r>
-                        <a:rPr lang="en-GB" sz="1400" b="0" dirty="0"/>
-                        <a:t>Constraints and limits</a:t>
+                        <a:t>Animation of articulated figures</a:t>
                       </a:r>
                     </a:p>
                   </a:txBody>

</xml_diff>